<commit_message>
Draft 2 Presentation Slides and PDF
</commit_message>
<xml_diff>
--- a/Project 1 - Exploring the Relationship between Weather and Households Energy.pptx
+++ b/Project 1 - Exploring the Relationship between Weather and Households Energy.pptx
@@ -9359,29 +9359,54 @@
           </a:p>
           <a:p>
             <a:pPr marL="457200" indent="-457200">
+              <a:buFont typeface="Arial" panose="020B0604020202020204" pitchFamily="34" charset="0"/>
               <a:buAutoNum type="arabicParenBoth"/>
             </a:pPr>
             <a:r>
-              <a:rPr lang="en-US" dirty="0"/>
-              <a:t>If a energy conservation strategy works in this area, due to the </a:t>
+              <a:rPr lang="en-US" b="0" i="0" dirty="0">
+                <a:solidFill>
+                  <a:srgbClr val="000000"/>
+                </a:solidFill>
+                <a:effectLst/>
+                <a:latin typeface="+mj-lt"/>
+              </a:rPr>
+              <a:t>Any successful recommendations are expandable to all other towns due to the </a:t>
             </a:r>
             <a:r>
-              <a:rPr lang="en-US" b="1" dirty="0">
+              <a:rPr lang="en-US" b="1" i="0" dirty="0">
                 <a:solidFill>
-                  <a:schemeClr val="accent6">
-                    <a:lumMod val="50000"/>
-                  </a:schemeClr>
+                  <a:srgbClr val="000000"/>
                 </a:solidFill>
+                <a:effectLst/>
+                <a:latin typeface="+mj-lt"/>
               </a:rPr>
-              <a:t>high</a:t>
+              <a:t>high level of </a:t>
             </a:r>
             <a:r>
-              <a:rPr lang="en-US" dirty="0"/>
-              <a:t> correlation between energy consumption patterns across areas, the campaign can expand to island-wide.</a:t>
+              <a:rPr lang="en-US" b="1" i="0" dirty="0" err="1">
+                <a:solidFill>
+                  <a:srgbClr val="000000"/>
+                </a:solidFill>
+                <a:effectLst/>
+                <a:latin typeface="+mj-lt"/>
+              </a:rPr>
+              <a:t>similiarity</a:t>
             </a:r>
-          </a:p>
-          <a:p>
-            <a:pPr marL="1200150" lvl="1" indent="-457200"/>
+            <a:r>
+              <a:rPr lang="en-US" b="0" i="0" dirty="0">
+                <a:solidFill>
+                  <a:srgbClr val="000000"/>
+                </a:solidFill>
+                <a:effectLst/>
+                <a:latin typeface="+mj-lt"/>
+              </a:rPr>
+              <a:t> between energy consumption patterns across areas.</a:t>
+            </a:r>
+          </a:p>
+          <a:p>
+            <a:pPr marL="457200" indent="-457200">
+              <a:buAutoNum type="arabicParenBoth"/>
+            </a:pPr>
             <a:endParaRPr lang="en-US" dirty="0"/>
           </a:p>
           <a:p>
@@ -9481,21 +9506,75 @@
           <a:bodyPr/>
           <a:lstStyle/>
           <a:p>
-            <a:pPr marL="457200" indent="-457200" algn="l">
+            <a:pPr marL="457200" indent="-457200">
+              <a:buFont typeface="Arial" panose="020B0604020202020204" pitchFamily="34" charset="0"/>
               <a:buAutoNum type="arabicPeriod"/>
             </a:pPr>
             <a:r>
               <a:rPr lang="en-US" dirty="0"/>
-              <a:t>Boxplot of Monthly Gas Consumption</a:t>
+              <a:t>Boxplot of Monthly Electricity Consumption across </a:t>
             </a:r>
-          </a:p>
-          <a:p>
-            <a:pPr marL="457200" indent="-457200" algn="l">
+            <a:r>
+              <a:rPr lang="en-US" b="1" dirty="0"/>
+              <a:t>all</a:t>
+            </a:r>
+            <a:r>
+              <a:rPr lang="en-US" dirty="0"/>
+              <a:t> towns</a:t>
+            </a:r>
+          </a:p>
+          <a:p>
+            <a:pPr marL="457200" indent="-457200">
+              <a:buFont typeface="Arial" panose="020B0604020202020204" pitchFamily="34" charset="0"/>
               <a:buAutoNum type="arabicPeriod"/>
             </a:pPr>
             <a:r>
               <a:rPr lang="en-US" dirty="0"/>
-              <a:t>Boxplot of Monthly Electricity Consumption</a:t>
+              <a:t>Boxplot of Monthly Electricity Consumption across </a:t>
+            </a:r>
+            <a:r>
+              <a:rPr lang="en-US" b="1" dirty="0"/>
+              <a:t>selected</a:t>
+            </a:r>
+            <a:r>
+              <a:rPr lang="en-US" dirty="0"/>
+              <a:t> towns</a:t>
+            </a:r>
+          </a:p>
+          <a:p>
+            <a:pPr marL="457200" indent="-457200">
+              <a:buFont typeface="Arial" panose="020B0604020202020204" pitchFamily="34" charset="0"/>
+              <a:buAutoNum type="arabicPeriod"/>
+            </a:pPr>
+            <a:r>
+              <a:rPr lang="en-US" dirty="0"/>
+              <a:t>Boxplot of Monthly Gas Consumption across </a:t>
+            </a:r>
+            <a:r>
+              <a:rPr lang="en-US" b="1" dirty="0"/>
+              <a:t>all</a:t>
+            </a:r>
+            <a:r>
+              <a:rPr lang="en-US" dirty="0"/>
+              <a:t> towns</a:t>
+            </a:r>
+          </a:p>
+          <a:p>
+            <a:pPr marL="457200" indent="-457200">
+              <a:buFont typeface="Arial" panose="020B0604020202020204" pitchFamily="34" charset="0"/>
+              <a:buAutoNum type="arabicPeriod"/>
+            </a:pPr>
+            <a:r>
+              <a:rPr lang="en-US" dirty="0"/>
+              <a:t>Boxplot of Monthly Gas Consumption across </a:t>
+            </a:r>
+            <a:r>
+              <a:rPr lang="en-US" b="1" dirty="0"/>
+              <a:t>selected</a:t>
+            </a:r>
+            <a:r>
+              <a:rPr lang="en-US" dirty="0"/>
+              <a:t> towns</a:t>
             </a:r>
           </a:p>
           <a:p>
@@ -9506,6 +9585,12 @@
               <a:rPr lang="en-US" dirty="0"/>
               <a:t>Boxplot of Monthly Total Energy Consumption</a:t>
             </a:r>
+          </a:p>
+          <a:p>
+            <a:pPr marL="457200" indent="-457200" algn="l">
+              <a:buAutoNum type="arabicPeriod"/>
+            </a:pPr>
+            <a:endParaRPr lang="en-US" dirty="0"/>
           </a:p>
           <a:p>
             <a:pPr marL="457200" indent="-457200">

</xml_diff>